<commit_message>
Pequenos melhoramentos e limpeza do repositório
</commit_message>
<xml_diff>
--- a/Data-Warehouse.pptx
+++ b/Data-Warehouse.pptx
@@ -3703,8 +3703,8 @@
         </p:nvSpPr>
         <p:spPr>
           <a:xfrm>
-            <a:off x="838200" y="2057399"/>
-            <a:ext cx="7086600" cy="4119563"/>
+            <a:off x="838200" y="2057400"/>
+            <a:ext cx="7280564" cy="1378528"/>
           </a:xfrm>
         </p:spPr>
         <p:txBody>
@@ -3749,12 +3749,52 @@
         </p:blipFill>
         <p:spPr>
           <a:xfrm>
-            <a:off x="8222625" y="2564605"/>
-            <a:ext cx="2695575" cy="3105150"/>
+            <a:off x="8502066" y="2730860"/>
+            <a:ext cx="2416134" cy="2783250"/>
           </a:xfrm>
           <a:prstGeom prst="rect">
             <a:avLst/>
           </a:prstGeom>
+        </p:spPr>
+      </p:pic>
+      <p:pic>
+        <p:nvPicPr>
+          <p:cNvPr id="7" name="Imagem 6"/>
+          <p:cNvPicPr>
+            <a:picLocks noChangeAspect="1"/>
+          </p:cNvPicPr>
+          <p:nvPr/>
+        </p:nvPicPr>
+        <p:blipFill>
+          <a:blip r:embed="rId3">
+            <a:extLst>
+              <a:ext uri="{28A0092B-C50C-407E-A947-70E740481C1C}">
+                <a14:useLocalDpi xmlns:a14="http://schemas.microsoft.com/office/drawing/2010/main" val="0"/>
+              </a:ext>
+            </a:extLst>
+          </a:blip>
+          <a:stretch>
+            <a:fillRect/>
+          </a:stretch>
+        </p:blipFill>
+        <p:spPr>
+          <a:xfrm>
+            <a:off x="2001981" y="3435928"/>
+            <a:ext cx="5110018" cy="2900280"/>
+          </a:xfrm>
+          <a:prstGeom prst="rect">
+            <a:avLst/>
+          </a:prstGeom>
+          <a:ln>
+            <a:noFill/>
+          </a:ln>
+          <a:effectLst>
+            <a:outerShdw blurRad="292100" dist="139700" dir="2700000" algn="tl" rotWithShape="0">
+              <a:srgbClr val="333333">
+                <a:alpha val="65000"/>
+              </a:srgbClr>
+            </a:outerShdw>
+          </a:effectLst>
         </p:spPr>
       </p:pic>
     </p:spTree>
@@ -7664,6 +7704,20 @@
 <file path=ppt/slides/slide4.xml><?xml version="1.0" encoding="utf-8"?>
 <p:sld xmlns:a="http://schemas.openxmlformats.org/drawingml/2006/main" xmlns:r="http://schemas.openxmlformats.org/officeDocument/2006/relationships" xmlns:p="http://schemas.openxmlformats.org/presentationml/2006/main">
   <p:cSld>
+    <p:bg>
+      <p:bgPr>
+        <a:blipFill dpi="0" rotWithShape="1">
+          <a:blip r:embed="rId2">
+            <a:lum/>
+          </a:blip>
+          <a:srcRect/>
+          <a:stretch>
+            <a:fillRect l="-10000" t="-25000" r="-5000" b="-9000"/>
+          </a:stretch>
+        </a:blipFill>
+        <a:effectLst/>
+      </p:bgPr>
+    </p:bg>
     <p:spTree>
       <p:nvGrpSpPr>
         <p:cNvPr id="1" name=""/>
@@ -7690,8 +7744,8 @@
         </p:nvSpPr>
         <p:spPr>
           <a:xfrm>
-            <a:off x="838200" y="500062"/>
-            <a:ext cx="10515600" cy="1325563"/>
+            <a:off x="4914899" y="74035"/>
+            <a:ext cx="2493819" cy="1325563"/>
           </a:xfrm>
         </p:spPr>
         <p:txBody>
@@ -7699,7 +7753,14 @@
           <a:lstStyle/>
           <a:p>
             <a:r>
-              <a:rPr lang="pt-PT" dirty="0">
+              <a:rPr lang="pt-PT" b="1" dirty="0">
+                <a:effectLst>
+                  <a:outerShdw blurRad="38100" dist="38100" dir="2700000" algn="tl">
+                    <a:srgbClr val="000000">
+                      <a:alpha val="43137"/>
+                    </a:srgbClr>
+                  </a:outerShdw>
+                </a:effectLst>
                 <a:latin typeface="+mn-lt"/>
               </a:rPr>
               <a:t>Estrutura</a:t>
@@ -7710,13 +7771,15 @@
       <p:cxnSp>
         <p:nvCxnSpPr>
           <p:cNvPr id="5" name="Conexão reta 4"/>
-          <p:cNvCxnSpPr/>
+          <p:cNvCxnSpPr>
+            <a:cxnSpLocks/>
+          </p:cNvCxnSpPr>
           <p:nvPr/>
         </p:nvCxnSpPr>
         <p:spPr>
-          <a:xfrm flipV="1">
-            <a:off x="838200" y="1660991"/>
-            <a:ext cx="10080000" cy="2"/>
+          <a:xfrm>
+            <a:off x="4686300" y="1245356"/>
+            <a:ext cx="2795155" cy="0"/>
           </a:xfrm>
           <a:prstGeom prst="line">
             <a:avLst/>
@@ -7742,68 +7805,6 @@
           </a:fontRef>
         </p:style>
       </p:cxnSp>
-      <p:pic>
-        <p:nvPicPr>
-          <p:cNvPr id="3076" name="Picture 4" descr="database.png"/>
-          <p:cNvPicPr>
-            <a:picLocks noChangeAspect="1" noChangeArrowheads="1"/>
-          </p:cNvPicPr>
-          <p:nvPr/>
-        </p:nvPicPr>
-        <p:blipFill>
-          <a:blip r:embed="rId2">
-            <a:extLst>
-              <a:ext uri="{28A0092B-C50C-407E-A947-70E740481C1C}">
-                <a14:useLocalDpi xmlns:a14="http://schemas.microsoft.com/office/drawing/2010/main" val="0"/>
-              </a:ext>
-            </a:extLst>
-          </a:blip>
-          <a:srcRect/>
-          <a:stretch>
-            <a:fillRect/>
-          </a:stretch>
-        </p:blipFill>
-        <p:spPr bwMode="auto">
-          <a:xfrm>
-            <a:off x="2867025" y="1955190"/>
-            <a:ext cx="6013206" cy="4087629"/>
-          </a:xfrm>
-          <a:prstGeom prst="rect">
-            <a:avLst/>
-          </a:prstGeom>
-          <a:solidFill>
-            <a:srgbClr val="FFFFFF">
-              <a:shade val="85000"/>
-            </a:srgbClr>
-          </a:solidFill>
-          <a:ln w="88900" cap="sq">
-            <a:solidFill>
-              <a:srgbClr val="FFFFFF"/>
-            </a:solidFill>
-            <a:miter lim="800000"/>
-          </a:ln>
-          <a:effectLst>
-            <a:outerShdw blurRad="55000" dist="18000" dir="5400000" algn="tl" rotWithShape="0">
-              <a:srgbClr val="000000">
-                <a:alpha val="40000"/>
-              </a:srgbClr>
-            </a:outerShdw>
-          </a:effectLst>
-          <a:scene3d>
-            <a:camera prst="orthographicFront"/>
-            <a:lightRig rig="twoPt" dir="t">
-              <a:rot lat="0" lon="0" rev="7200000"/>
-            </a:lightRig>
-          </a:scene3d>
-          <a:sp3d>
-            <a:bevelT w="25400" h="19050"/>
-            <a:contourClr>
-              <a:srgbClr val="FFFFFF"/>
-            </a:contourClr>
-          </a:sp3d>
-          <a:extLst/>
-        </p:spPr>
-      </p:pic>
     </p:spTree>
     <p:extLst>
       <p:ext uri="{BB962C8B-B14F-4D97-AF65-F5344CB8AC3E}">
@@ -8010,8 +8011,8 @@
         </p:nvSpPr>
         <p:spPr>
           <a:xfrm>
-            <a:off x="838200" y="2057399"/>
-            <a:ext cx="6152535" cy="4119563"/>
+            <a:off x="838200" y="2057400"/>
+            <a:ext cx="7659255" cy="1332346"/>
           </a:xfrm>
         </p:spPr>
         <p:txBody>
@@ -8045,12 +8046,52 @@
         </p:blipFill>
         <p:spPr>
           <a:xfrm>
-            <a:off x="8270250" y="1983580"/>
-            <a:ext cx="2647950" cy="4267200"/>
+            <a:off x="8811491" y="2356533"/>
+            <a:ext cx="2106709" cy="3394984"/>
           </a:xfrm>
           <a:prstGeom prst="rect">
             <a:avLst/>
           </a:prstGeom>
+        </p:spPr>
+      </p:pic>
+      <p:pic>
+        <p:nvPicPr>
+          <p:cNvPr id="8" name="Imagem 7"/>
+          <p:cNvPicPr>
+            <a:picLocks noChangeAspect="1"/>
+          </p:cNvPicPr>
+          <p:nvPr/>
+        </p:nvPicPr>
+        <p:blipFill>
+          <a:blip r:embed="rId3">
+            <a:extLst>
+              <a:ext uri="{28A0092B-C50C-407E-A947-70E740481C1C}">
+                <a14:useLocalDpi xmlns:a14="http://schemas.microsoft.com/office/drawing/2010/main" val="0"/>
+              </a:ext>
+            </a:extLst>
+          </a:blip>
+          <a:stretch>
+            <a:fillRect/>
+          </a:stretch>
+        </p:blipFill>
+        <p:spPr>
+          <a:xfrm>
+            <a:off x="1650999" y="3389746"/>
+            <a:ext cx="6033655" cy="2980974"/>
+          </a:xfrm>
+          <a:prstGeom prst="rect">
+            <a:avLst/>
+          </a:prstGeom>
+          <a:ln>
+            <a:noFill/>
+          </a:ln>
+          <a:effectLst>
+            <a:outerShdw blurRad="292100" dist="139700" dir="2700000" algn="tl" rotWithShape="0">
+              <a:srgbClr val="333333">
+                <a:alpha val="65000"/>
+              </a:srgbClr>
+            </a:outerShdw>
+          </a:effectLst>
         </p:spPr>
       </p:pic>
     </p:spTree>
@@ -8161,7 +8202,7 @@
         <p:spPr>
           <a:xfrm>
             <a:off x="838199" y="2057399"/>
-            <a:ext cx="6098309" cy="4119563"/>
+            <a:ext cx="7566892" cy="764523"/>
           </a:xfrm>
         </p:spPr>
         <p:txBody>
@@ -8195,12 +8236,52 @@
         </p:blipFill>
         <p:spPr>
           <a:xfrm>
-            <a:off x="8260725" y="3159917"/>
-            <a:ext cx="2657475" cy="1914525"/>
+            <a:off x="8778658" y="3344645"/>
+            <a:ext cx="2139542" cy="1541391"/>
           </a:xfrm>
           <a:prstGeom prst="rect">
             <a:avLst/>
           </a:prstGeom>
+        </p:spPr>
+      </p:pic>
+      <p:pic>
+        <p:nvPicPr>
+          <p:cNvPr id="7" name="Imagem 6"/>
+          <p:cNvPicPr>
+            <a:picLocks noChangeAspect="1"/>
+          </p:cNvPicPr>
+          <p:nvPr/>
+        </p:nvPicPr>
+        <p:blipFill>
+          <a:blip r:embed="rId3">
+            <a:extLst>
+              <a:ext uri="{28A0092B-C50C-407E-A947-70E740481C1C}">
+                <a14:useLocalDpi xmlns:a14="http://schemas.microsoft.com/office/drawing/2010/main" val="0"/>
+              </a:ext>
+            </a:extLst>
+          </a:blip>
+          <a:stretch>
+            <a:fillRect/>
+          </a:stretch>
+        </p:blipFill>
+        <p:spPr>
+          <a:xfrm>
+            <a:off x="1686238" y="2821922"/>
+            <a:ext cx="5859872" cy="3477418"/>
+          </a:xfrm>
+          <a:prstGeom prst="rect">
+            <a:avLst/>
+          </a:prstGeom>
+          <a:ln>
+            <a:noFill/>
+          </a:ln>
+          <a:effectLst>
+            <a:outerShdw blurRad="292100" dist="139700" dir="2700000" algn="tl" rotWithShape="0">
+              <a:srgbClr val="333333">
+                <a:alpha val="65000"/>
+              </a:srgbClr>
+            </a:outerShdw>
+          </a:effectLst>
         </p:spPr>
       </p:pic>
     </p:spTree>
@@ -8307,8 +8388,8 @@
         </p:nvSpPr>
         <p:spPr>
           <a:xfrm>
-            <a:off x="838200" y="2057399"/>
-            <a:ext cx="6366164" cy="4119563"/>
+            <a:off x="838199" y="2057400"/>
+            <a:ext cx="7511473" cy="1480128"/>
           </a:xfrm>
         </p:spPr>
         <p:txBody>
@@ -8327,7 +8408,7 @@
             <a:pPr algn="just"/>
             <a:r>
               <a:rPr lang="pt-PT" dirty="0"/>
-              <a:t>formato UNIX TIME.</a:t>
+              <a:t>Formato UNIX TIME.</a:t>
             </a:r>
             <a:endParaRPr lang="pt-PT" dirty="0">
               <a:latin typeface="+mj-lt"/>
@@ -8351,12 +8432,52 @@
         </p:blipFill>
         <p:spPr>
           <a:xfrm>
-            <a:off x="8559721" y="1965067"/>
-            <a:ext cx="2358479" cy="4304225"/>
+            <a:off x="8710347" y="2102513"/>
+            <a:ext cx="2207853" cy="4029333"/>
           </a:xfrm>
           <a:prstGeom prst="rect">
             <a:avLst/>
           </a:prstGeom>
+        </p:spPr>
+      </p:pic>
+      <p:pic>
+        <p:nvPicPr>
+          <p:cNvPr id="7" name="Imagem 6"/>
+          <p:cNvPicPr>
+            <a:picLocks noChangeAspect="1"/>
+          </p:cNvPicPr>
+          <p:nvPr/>
+        </p:nvPicPr>
+        <p:blipFill>
+          <a:blip r:embed="rId3">
+            <a:extLst>
+              <a:ext uri="{28A0092B-C50C-407E-A947-70E740481C1C}">
+                <a14:useLocalDpi xmlns:a14="http://schemas.microsoft.com/office/drawing/2010/main" val="0"/>
+              </a:ext>
+            </a:extLst>
+          </a:blip>
+          <a:stretch>
+            <a:fillRect/>
+          </a:stretch>
+        </p:blipFill>
+        <p:spPr>
+          <a:xfrm>
+            <a:off x="1609434" y="3537528"/>
+            <a:ext cx="5969001" cy="2800392"/>
+          </a:xfrm>
+          <a:prstGeom prst="rect">
+            <a:avLst/>
+          </a:prstGeom>
+          <a:ln>
+            <a:noFill/>
+          </a:ln>
+          <a:effectLst>
+            <a:outerShdw blurRad="292100" dist="139700" dir="2700000" algn="tl" rotWithShape="0">
+              <a:srgbClr val="333333">
+                <a:alpha val="65000"/>
+              </a:srgbClr>
+            </a:outerShdw>
+          </a:effectLst>
         </p:spPr>
       </p:pic>
     </p:spTree>
@@ -8467,7 +8588,7 @@
         <p:spPr>
           <a:xfrm>
             <a:off x="838200" y="2057399"/>
-            <a:ext cx="6827982" cy="4119563"/>
+            <a:ext cx="7299036" cy="764523"/>
           </a:xfrm>
         </p:spPr>
         <p:txBody>
@@ -8512,12 +8633,52 @@
         </p:blipFill>
         <p:spPr>
           <a:xfrm>
-            <a:off x="8241675" y="3164680"/>
-            <a:ext cx="2676525" cy="1905000"/>
+            <a:off x="8636000" y="3303224"/>
+            <a:ext cx="2282200" cy="1624341"/>
           </a:xfrm>
           <a:prstGeom prst="rect">
             <a:avLst/>
           </a:prstGeom>
+        </p:spPr>
+      </p:pic>
+      <p:pic>
+        <p:nvPicPr>
+          <p:cNvPr id="7" name="Imagem 6"/>
+          <p:cNvPicPr>
+            <a:picLocks noChangeAspect="1"/>
+          </p:cNvPicPr>
+          <p:nvPr/>
+        </p:nvPicPr>
+        <p:blipFill>
+          <a:blip r:embed="rId3">
+            <a:extLst>
+              <a:ext uri="{28A0092B-C50C-407E-A947-70E740481C1C}">
+                <a14:useLocalDpi xmlns:a14="http://schemas.microsoft.com/office/drawing/2010/main" val="0"/>
+              </a:ext>
+            </a:extLst>
+          </a:blip>
+          <a:stretch>
+            <a:fillRect/>
+          </a:stretch>
+        </p:blipFill>
+        <p:spPr>
+          <a:xfrm>
+            <a:off x="1660236" y="2821922"/>
+            <a:ext cx="5654964" cy="3392978"/>
+          </a:xfrm>
+          <a:prstGeom prst="rect">
+            <a:avLst/>
+          </a:prstGeom>
+          <a:ln>
+            <a:noFill/>
+          </a:ln>
+          <a:effectLst>
+            <a:outerShdw blurRad="292100" dist="139700" dir="2700000" algn="tl" rotWithShape="0">
+              <a:srgbClr val="333333">
+                <a:alpha val="65000"/>
+              </a:srgbClr>
+            </a:outerShdw>
+          </a:effectLst>
         </p:spPr>
       </p:pic>
     </p:spTree>

</xml_diff>